<commit_message>
add firewall inbound rule
</commit_message>
<xml_diff>
--- a/doc/time_synchronization.pptx
+++ b/doc/time_synchronization.pptx
@@ -9,10 +9,10 @@
     <p:sldId id="262" r:id="rId3"/>
     <p:sldId id="260" r:id="rId4"/>
     <p:sldId id="261" r:id="rId5"/>
-    <p:sldId id="258" r:id="rId6"/>
-    <p:sldId id="263" r:id="rId7"/>
-    <p:sldId id="264" r:id="rId8"/>
-    <p:sldId id="272" r:id="rId9"/>
+    <p:sldId id="272" r:id="rId6"/>
+    <p:sldId id="258" r:id="rId7"/>
+    <p:sldId id="263" r:id="rId8"/>
+    <p:sldId id="264" r:id="rId9"/>
     <p:sldId id="265" r:id="rId10"/>
     <p:sldId id="266" r:id="rId11"/>
     <p:sldId id="271" r:id="rId12"/>
@@ -273,7 +273,7 @@
           <a:p>
             <a:fld id="{4B52E3D8-F22A-47D7-9F70-F613600D8D26}" type="datetimeFigureOut">
               <a:rPr lang="ko-KR" altLang="en-US" smtClean="0"/>
-              <a:t>2023-03-31</a:t>
+              <a:t>2023-04-03</a:t>
             </a:fld>
             <a:endParaRPr lang="ko-KR" altLang="en-US"/>
           </a:p>
@@ -471,7 +471,7 @@
           <a:p>
             <a:fld id="{4B52E3D8-F22A-47D7-9F70-F613600D8D26}" type="datetimeFigureOut">
               <a:rPr lang="ko-KR" altLang="en-US" smtClean="0"/>
-              <a:t>2023-03-31</a:t>
+              <a:t>2023-04-03</a:t>
             </a:fld>
             <a:endParaRPr lang="ko-KR" altLang="en-US"/>
           </a:p>
@@ -679,7 +679,7 @@
           <a:p>
             <a:fld id="{4B52E3D8-F22A-47D7-9F70-F613600D8D26}" type="datetimeFigureOut">
               <a:rPr lang="ko-KR" altLang="en-US" smtClean="0"/>
-              <a:t>2023-03-31</a:t>
+              <a:t>2023-04-03</a:t>
             </a:fld>
             <a:endParaRPr lang="ko-KR" altLang="en-US"/>
           </a:p>
@@ -877,7 +877,7 @@
           <a:p>
             <a:fld id="{4B52E3D8-F22A-47D7-9F70-F613600D8D26}" type="datetimeFigureOut">
               <a:rPr lang="ko-KR" altLang="en-US" smtClean="0"/>
-              <a:t>2023-03-31</a:t>
+              <a:t>2023-04-03</a:t>
             </a:fld>
             <a:endParaRPr lang="ko-KR" altLang="en-US"/>
           </a:p>
@@ -1152,7 +1152,7 @@
           <a:p>
             <a:fld id="{4B52E3D8-F22A-47D7-9F70-F613600D8D26}" type="datetimeFigureOut">
               <a:rPr lang="ko-KR" altLang="en-US" smtClean="0"/>
-              <a:t>2023-03-31</a:t>
+              <a:t>2023-04-03</a:t>
             </a:fld>
             <a:endParaRPr lang="ko-KR" altLang="en-US"/>
           </a:p>
@@ -1417,7 +1417,7 @@
           <a:p>
             <a:fld id="{4B52E3D8-F22A-47D7-9F70-F613600D8D26}" type="datetimeFigureOut">
               <a:rPr lang="ko-KR" altLang="en-US" smtClean="0"/>
-              <a:t>2023-03-31</a:t>
+              <a:t>2023-04-03</a:t>
             </a:fld>
             <a:endParaRPr lang="ko-KR" altLang="en-US"/>
           </a:p>
@@ -1829,7 +1829,7 @@
           <a:p>
             <a:fld id="{4B52E3D8-F22A-47D7-9F70-F613600D8D26}" type="datetimeFigureOut">
               <a:rPr lang="ko-KR" altLang="en-US" smtClean="0"/>
-              <a:t>2023-03-31</a:t>
+              <a:t>2023-04-03</a:t>
             </a:fld>
             <a:endParaRPr lang="ko-KR" altLang="en-US"/>
           </a:p>
@@ -1970,7 +1970,7 @@
           <a:p>
             <a:fld id="{4B52E3D8-F22A-47D7-9F70-F613600D8D26}" type="datetimeFigureOut">
               <a:rPr lang="ko-KR" altLang="en-US" smtClean="0"/>
-              <a:t>2023-03-31</a:t>
+              <a:t>2023-04-03</a:t>
             </a:fld>
             <a:endParaRPr lang="ko-KR" altLang="en-US"/>
           </a:p>
@@ -2083,7 +2083,7 @@
           <a:p>
             <a:fld id="{4B52E3D8-F22A-47D7-9F70-F613600D8D26}" type="datetimeFigureOut">
               <a:rPr lang="ko-KR" altLang="en-US" smtClean="0"/>
-              <a:t>2023-03-31</a:t>
+              <a:t>2023-04-03</a:t>
             </a:fld>
             <a:endParaRPr lang="ko-KR" altLang="en-US"/>
           </a:p>
@@ -2394,7 +2394,7 @@
           <a:p>
             <a:fld id="{4B52E3D8-F22A-47D7-9F70-F613600D8D26}" type="datetimeFigureOut">
               <a:rPr lang="ko-KR" altLang="en-US" smtClean="0"/>
-              <a:t>2023-03-31</a:t>
+              <a:t>2023-04-03</a:t>
             </a:fld>
             <a:endParaRPr lang="ko-KR" altLang="en-US"/>
           </a:p>
@@ -2682,7 +2682,7 @@
           <a:p>
             <a:fld id="{4B52E3D8-F22A-47D7-9F70-F613600D8D26}" type="datetimeFigureOut">
               <a:rPr lang="ko-KR" altLang="en-US" smtClean="0"/>
-              <a:t>2023-03-31</a:t>
+              <a:t>2023-04-03</a:t>
             </a:fld>
             <a:endParaRPr lang="ko-KR" altLang="en-US"/>
           </a:p>
@@ -2923,7 +2923,7 @@
           <a:p>
             <a:fld id="{4B52E3D8-F22A-47D7-9F70-F613600D8D26}" type="datetimeFigureOut">
               <a:rPr lang="ko-KR" altLang="en-US" smtClean="0"/>
-              <a:t>2023-03-31</a:t>
+              <a:t>2023-04-03</a:t>
             </a:fld>
             <a:endParaRPr lang="ko-KR" altLang="en-US"/>
           </a:p>
@@ -4100,10 +4100,10 @@
       </p:grpSp>
       <p:sp>
         <p:nvSpPr>
-          <p:cNvPr id="26" name="TextBox 25">
-            <a:extLst>
-              <a:ext uri="{FF2B5EF4-FFF2-40B4-BE49-F238E27FC236}">
-                <a16:creationId xmlns:a16="http://schemas.microsoft.com/office/drawing/2014/main" id="{F0C912C3-6827-4BCD-A3E7-1F31B3CD13C1}"/>
+          <p:cNvPr id="24" name="TextBox 23">
+            <a:extLst>
+              <a:ext uri="{FF2B5EF4-FFF2-40B4-BE49-F238E27FC236}">
+                <a16:creationId xmlns:a16="http://schemas.microsoft.com/office/drawing/2014/main" id="{B75BF2C5-C007-4D36-A4F1-3C67FA8862DF}"/>
               </a:ext>
             </a:extLst>
           </p:cNvPr>
@@ -4133,7 +4133,7 @@
                 </a:solidFill>
                 <a:hlinkClick r:id="rId6" action="ppaction://hlinksldjump"/>
               </a:rPr>
-              <a:t>8</a:t>
+              <a:t>5</a:t>
             </a:r>
             <a:r>
               <a:rPr lang="ko-KR" altLang="en-US" sz="800" dirty="0">
@@ -4417,10 +4417,10 @@
       </p:sp>
       <p:sp>
         <p:nvSpPr>
-          <p:cNvPr id="8" name="TextBox 7">
-            <a:extLst>
-              <a:ext uri="{FF2B5EF4-FFF2-40B4-BE49-F238E27FC236}">
-                <a16:creationId xmlns:a16="http://schemas.microsoft.com/office/drawing/2014/main" id="{03AE9523-1D3F-4165-914D-2B8424D50304}"/>
+          <p:cNvPr id="7" name="TextBox 6">
+            <a:extLst>
+              <a:ext uri="{FF2B5EF4-FFF2-40B4-BE49-F238E27FC236}">
+                <a16:creationId xmlns:a16="http://schemas.microsoft.com/office/drawing/2014/main" id="{53175597-772E-4AD8-BF9E-34004DCCEA68}"/>
               </a:ext>
             </a:extLst>
           </p:cNvPr>
@@ -4450,7 +4450,7 @@
                 </a:solidFill>
                 <a:hlinkClick r:id="rId3" action="ppaction://hlinksldjump"/>
               </a:rPr>
-              <a:t>8</a:t>
+              <a:t>5</a:t>
             </a:r>
             <a:r>
               <a:rPr lang="ko-KR" altLang="en-US" sz="800" dirty="0">
@@ -4681,7 +4681,7 @@
         <p:spPr>
           <a:xfrm>
             <a:off x="5588000" y="3012295"/>
-            <a:ext cx="6806979" cy="1200329"/>
+            <a:ext cx="5651837" cy="1200329"/>
           </a:xfrm>
           <a:prstGeom prst="rect">
             <a:avLst/>
@@ -9643,45 +9643,6 @@
           </a:p>
         </p:txBody>
       </p:sp>
-      <p:pic>
-        <p:nvPicPr>
-          <p:cNvPr id="19" name="그림 18" descr="C:\Users\KETI_UnstructedWork\AppData\Local\Microsoft\Windows\INetCache\Content.MSO\21287955.tmp">
-            <a:extLst>
-              <a:ext uri="{FF2B5EF4-FFF2-40B4-BE49-F238E27FC236}">
-                <a16:creationId xmlns:a16="http://schemas.microsoft.com/office/drawing/2014/main" id="{72C8A024-D4A3-46EC-9916-9E2B9C98CAA5}"/>
-              </a:ext>
-            </a:extLst>
-          </p:cNvPr>
-          <p:cNvPicPr/>
-          <p:nvPr/>
-        </p:nvPicPr>
-        <p:blipFill>
-          <a:blip r:embed="rId2" cstate="print">
-            <a:extLst>
-              <a:ext uri="{28A0092B-C50C-407E-A947-70E740481C1C}">
-                <a14:useLocalDpi xmlns:a14="http://schemas.microsoft.com/office/drawing/2010/main" val="0"/>
-              </a:ext>
-            </a:extLst>
-          </a:blip>
-          <a:srcRect/>
-          <a:stretch>
-            <a:fillRect/>
-          </a:stretch>
-        </p:blipFill>
-        <p:spPr bwMode="auto">
-          <a:xfrm>
-            <a:off x="838200" y="2342643"/>
-            <a:ext cx="4768910" cy="3936776"/>
-          </a:xfrm>
-          <a:prstGeom prst="rect">
-            <a:avLst/>
-          </a:prstGeom>
-          <a:noFill/>
-          <a:ln>
-            <a:noFill/>
-          </a:ln>
-        </p:spPr>
-      </p:pic>
       <p:sp>
         <p:nvSpPr>
           <p:cNvPr id="3" name="TextBox 2">
@@ -9696,8 +9657,8 @@
         </p:nvSpPr>
         <p:spPr>
           <a:xfrm>
-            <a:off x="838200" y="1827954"/>
-            <a:ext cx="7800723" cy="369332"/>
+            <a:off x="838200" y="1689504"/>
+            <a:ext cx="10320717" cy="369332"/>
           </a:xfrm>
           <a:prstGeom prst="rect">
             <a:avLst/>
@@ -9710,41 +9671,30 @@
           </a:bodyPr>
           <a:lstStyle/>
           <a:p>
+            <a:pPr fontAlgn="base"/>
             <a:r>
               <a:rPr lang="en-US" altLang="ko-KR" dirty="0"/>
               <a:t>1. </a:t>
             </a:r>
             <a:r>
-              <a:rPr lang="ko-KR" altLang="ko-KR" dirty="0"/>
-              <a:t>방화벽 실행</a:t>
+              <a:rPr lang="ko-KR" altLang="en-US" dirty="0"/>
+              <a:t>관리자 권한으로 </a:t>
+            </a:r>
+            <a:r>
+              <a:rPr lang="en-US" altLang="ko-KR" dirty="0" err="1"/>
+              <a:t>Pycharm</a:t>
             </a:r>
             <a:r>
               <a:rPr lang="en-US" altLang="ko-KR" dirty="0"/>
-              <a:t> -&gt; </a:t>
-            </a:r>
-            <a:r>
-              <a:rPr lang="ko-KR" altLang="ko-KR" dirty="0"/>
-              <a:t>고급 보안이 포함된</a:t>
+              <a:t> </a:t>
+            </a:r>
+            <a:r>
+              <a:rPr lang="ko-KR" altLang="en-US" dirty="0"/>
+              <a:t>실행 후</a:t>
             </a:r>
             <a:r>
               <a:rPr lang="en-US" altLang="ko-KR" dirty="0"/>
-              <a:t> Windows Defender </a:t>
-            </a:r>
-            <a:r>
-              <a:rPr lang="ko-KR" altLang="ko-KR" dirty="0"/>
-              <a:t>방화벽</a:t>
-            </a:r>
-            <a:r>
-              <a:rPr lang="en-US" altLang="ko-KR" dirty="0"/>
-              <a:t>' </a:t>
-            </a:r>
-            <a:r>
-              <a:rPr lang="ko-KR" altLang="ko-KR" dirty="0"/>
-              <a:t>실행</a:t>
-            </a:r>
-            <a:r>
-              <a:rPr lang="en-US" altLang="ko-KR" dirty="0"/>
-              <a:t> </a:t>
+              <a:t>, python window_w32time.py -f -e -c -r  </a:t>
             </a:r>
             <a:endParaRPr lang="ko-KR" altLang="ko-KR" dirty="0"/>
           </a:p>
@@ -9752,47 +9702,177 @@
       </p:sp>
       <p:pic>
         <p:nvPicPr>
-          <p:cNvPr id="25" name="그림 24" descr="C:\Users\KETI_UnstructedWork\AppData\Local\Microsoft\Windows\INetCache\Content.MSO\9D040B2B.tmp">
-            <a:extLst>
-              <a:ext uri="{FF2B5EF4-FFF2-40B4-BE49-F238E27FC236}">
-                <a16:creationId xmlns:a16="http://schemas.microsoft.com/office/drawing/2014/main" id="{D3B124BF-904F-463C-8D69-EC70AD26BCC2}"/>
-              </a:ext>
-            </a:extLst>
-          </p:cNvPr>
-          <p:cNvPicPr/>
+          <p:cNvPr id="5" name="그림 4">
+            <a:extLst>
+              <a:ext uri="{FF2B5EF4-FFF2-40B4-BE49-F238E27FC236}">
+                <a16:creationId xmlns:a16="http://schemas.microsoft.com/office/drawing/2014/main" id="{ECB3D736-AA8B-4A0E-808E-B566819A80CD}"/>
+              </a:ext>
+            </a:extLst>
+          </p:cNvPr>
+          <p:cNvPicPr>
+            <a:picLocks noChangeAspect="1"/>
+          </p:cNvPicPr>
           <p:nvPr/>
         </p:nvPicPr>
         <p:blipFill>
-          <a:blip r:embed="rId3" cstate="print">
-            <a:extLst>
-              <a:ext uri="{28A0092B-C50C-407E-A947-70E740481C1C}">
-                <a14:useLocalDpi xmlns:a14="http://schemas.microsoft.com/office/drawing/2010/main" val="0"/>
-              </a:ext>
-            </a:extLst>
-          </a:blip>
-          <a:srcRect/>
+          <a:blip r:embed="rId2"/>
           <a:stretch>
             <a:fillRect/>
           </a:stretch>
         </p:blipFill>
-        <p:spPr bwMode="auto">
-          <a:xfrm>
-            <a:off x="5903637" y="2853267"/>
-            <a:ext cx="4654576" cy="2463430"/>
+        <p:spPr>
+          <a:xfrm>
+            <a:off x="308763" y="2729029"/>
+            <a:ext cx="1738682" cy="2880856"/>
+          </a:xfrm>
+          <a:prstGeom prst="rect">
+            <a:avLst/>
+          </a:prstGeom>
+        </p:spPr>
+      </p:pic>
+      <p:pic>
+        <p:nvPicPr>
+          <p:cNvPr id="7" name="그림 6">
+            <a:extLst>
+              <a:ext uri="{FF2B5EF4-FFF2-40B4-BE49-F238E27FC236}">
+                <a16:creationId xmlns:a16="http://schemas.microsoft.com/office/drawing/2014/main" id="{0EDFF87F-B0C7-410F-A170-FD7AA3E9E9F1}"/>
+              </a:ext>
+            </a:extLst>
+          </p:cNvPr>
+          <p:cNvPicPr>
+            <a:picLocks noChangeAspect="1"/>
+          </p:cNvPicPr>
+          <p:nvPr/>
+        </p:nvPicPr>
+        <p:blipFill>
+          <a:blip r:embed="rId3"/>
+          <a:stretch>
+            <a:fillRect/>
+          </a:stretch>
+        </p:blipFill>
+        <p:spPr>
+          <a:xfrm>
+            <a:off x="2409507" y="2230339"/>
+            <a:ext cx="3181304" cy="4408998"/>
+          </a:xfrm>
+          <a:prstGeom prst="rect">
+            <a:avLst/>
+          </a:prstGeom>
+        </p:spPr>
+      </p:pic>
+      <p:sp>
+        <p:nvSpPr>
+          <p:cNvPr id="9" name="TextBox 8">
+            <a:extLst>
+              <a:ext uri="{FF2B5EF4-FFF2-40B4-BE49-F238E27FC236}">
+                <a16:creationId xmlns:a16="http://schemas.microsoft.com/office/drawing/2014/main" id="{46F06316-D727-4608-A22B-E7D8B0BE1132}"/>
+              </a:ext>
+            </a:extLst>
+          </p:cNvPr>
+          <p:cNvSpPr txBox="1"/>
+          <p:nvPr/>
+        </p:nvSpPr>
+        <p:spPr>
+          <a:xfrm>
+            <a:off x="5858345" y="3155418"/>
+            <a:ext cx="5651837" cy="1200329"/>
           </a:xfrm>
           <a:prstGeom prst="rect">
             <a:avLst/>
           </a:prstGeom>
           <a:noFill/>
-          <a:ln>
-            <a:noFill/>
-          </a:ln>
         </p:spPr>
-      </p:pic>
+        <p:txBody>
+          <a:bodyPr wrap="square" rtlCol="0">
+            <a:spAutoFit/>
+          </a:bodyPr>
+          <a:lstStyle/>
+          <a:p>
+            <a:pPr lvl="0" fontAlgn="base"/>
+            <a:r>
+              <a:rPr lang="en-US" altLang="ko-KR" dirty="0"/>
+              <a:t>-f : </a:t>
+            </a:r>
+            <a:r>
+              <a:rPr lang="ko-KR" altLang="en-US" dirty="0"/>
+              <a:t>방화벽 </a:t>
+            </a:r>
+            <a:r>
+              <a:rPr lang="ko-KR" altLang="en-US" dirty="0" err="1"/>
+              <a:t>인바운드</a:t>
+            </a:r>
+            <a:r>
+              <a:rPr lang="ko-KR" altLang="en-US" dirty="0"/>
+              <a:t> 규칙 추가</a:t>
+            </a:r>
+            <a:endParaRPr lang="en-US" altLang="ko-KR" dirty="0"/>
+          </a:p>
+          <a:p>
+            <a:pPr lvl="0" fontAlgn="base"/>
+            <a:r>
+              <a:rPr lang="en-US" altLang="ko-KR" dirty="0"/>
+              <a:t>-e : </a:t>
+            </a:r>
+            <a:r>
+              <a:rPr lang="ko-KR" altLang="en-US" dirty="0"/>
+              <a:t>레지스트리 편집기 값</a:t>
+            </a:r>
+            <a:r>
+              <a:rPr lang="en-US" altLang="ko-KR" dirty="0"/>
+              <a:t> </a:t>
+            </a:r>
+            <a:r>
+              <a:rPr lang="ko-KR" altLang="en-US" dirty="0"/>
+              <a:t>설정 </a:t>
+            </a:r>
+            <a:endParaRPr lang="en-US" altLang="ko-KR" dirty="0"/>
+          </a:p>
+          <a:p>
+            <a:pPr lvl="0" fontAlgn="base"/>
+            <a:r>
+              <a:rPr lang="en-US" altLang="ko-KR" dirty="0"/>
+              <a:t>-c : NTP </a:t>
+            </a:r>
+            <a:r>
+              <a:rPr lang="ko-KR" altLang="en-US" dirty="0"/>
+              <a:t>서버 설정 확인</a:t>
+            </a:r>
+            <a:endParaRPr lang="en-US" altLang="ko-KR" dirty="0"/>
+          </a:p>
+          <a:p>
+            <a:pPr lvl="0" fontAlgn="base"/>
+            <a:r>
+              <a:rPr lang="en-US" altLang="ko-KR" dirty="0"/>
+              <a:t>-r : </a:t>
+            </a:r>
+            <a:r>
+              <a:rPr lang="ko-KR" altLang="en-US" dirty="0"/>
+              <a:t>부팅</a:t>
+            </a:r>
+            <a:r>
+              <a:rPr lang="en-US" altLang="ko-KR" dirty="0"/>
+              <a:t> </a:t>
+            </a:r>
+            <a:r>
+              <a:rPr lang="ko-KR" altLang="en-US" dirty="0"/>
+              <a:t>후에도 </a:t>
+            </a:r>
+            <a:r>
+              <a:rPr lang="en-US" altLang="ko-KR" dirty="0"/>
+              <a:t>w32time </a:t>
+            </a:r>
+            <a:r>
+              <a:rPr lang="ko-KR" altLang="en-US" dirty="0"/>
+              <a:t>자동 실행 설정</a:t>
+            </a:r>
+            <a:endParaRPr lang="en-US" altLang="ko-KR" dirty="0"/>
+          </a:p>
+        </p:txBody>
+      </p:sp>
     </p:spTree>
     <p:extLst>
       <p:ext uri="{BB962C8B-B14F-4D97-AF65-F5344CB8AC3E}">
-        <p14:creationId xmlns:p14="http://schemas.microsoft.com/office/powerpoint/2010/main" val="2881201960"/>
+        <p14:creationId xmlns:p14="http://schemas.microsoft.com/office/powerpoint/2010/main" val="187028842"/>
       </p:ext>
     </p:extLst>
   </p:cSld>
@@ -9843,123 +9923,35 @@
           <a:lstStyle/>
           <a:p>
             <a:r>
-              <a:rPr lang="en-US" altLang="ko-KR" sz="3200" dirty="0"/>
+              <a:rPr lang="en-US" altLang="ko-KR" sz="3200" strike="sngStrike" dirty="0"/>
               <a:t>Windows</a:t>
             </a:r>
             <a:r>
-              <a:rPr lang="ko-KR" altLang="en-US" sz="3200" dirty="0"/>
+              <a:rPr lang="ko-KR" altLang="en-US" sz="3200" strike="sngStrike" dirty="0"/>
               <a:t> </a:t>
             </a:r>
             <a:r>
-              <a:rPr lang="en-US" altLang="ko-KR" sz="3200" dirty="0"/>
+              <a:rPr lang="en-US" altLang="ko-KR" sz="3200" strike="sngStrike" dirty="0"/>
               <a:t>NTP</a:t>
             </a:r>
             <a:r>
-              <a:rPr lang="ko-KR" altLang="en-US" sz="3200" dirty="0"/>
+              <a:rPr lang="ko-KR" altLang="en-US" sz="3200" strike="sngStrike" dirty="0"/>
               <a:t> </a:t>
             </a:r>
             <a:r>
-              <a:rPr lang="en-US" altLang="ko-KR" sz="3200" dirty="0"/>
+              <a:rPr lang="en-US" altLang="ko-KR" sz="3200" strike="sngStrike" dirty="0"/>
               <a:t>Server</a:t>
             </a:r>
-            <a:endParaRPr lang="ko-KR" altLang="en-US" sz="3200" dirty="0"/>
-          </a:p>
-        </p:txBody>
-      </p:sp>
-      <p:sp>
-        <p:nvSpPr>
-          <p:cNvPr id="3" name="TextBox 2">
-            <a:extLst>
-              <a:ext uri="{FF2B5EF4-FFF2-40B4-BE49-F238E27FC236}">
-                <a16:creationId xmlns:a16="http://schemas.microsoft.com/office/drawing/2014/main" id="{FF53656A-FE07-42F5-B5F8-BDA79EA2D6A0}"/>
-              </a:ext>
-            </a:extLst>
-          </p:cNvPr>
-          <p:cNvSpPr txBox="1"/>
-          <p:nvPr/>
-        </p:nvSpPr>
-        <p:spPr>
-          <a:xfrm>
-            <a:off x="838200" y="1827954"/>
-            <a:ext cx="10320717" cy="369332"/>
-          </a:xfrm>
-          <a:prstGeom prst="rect">
-            <a:avLst/>
-          </a:prstGeom>
-          <a:noFill/>
-        </p:spPr>
-        <p:txBody>
-          <a:bodyPr wrap="square" rtlCol="0">
-            <a:spAutoFit/>
-          </a:bodyPr>
-          <a:lstStyle/>
-          <a:p>
-            <a:r>
-              <a:rPr lang="en-US" altLang="ko-KR" dirty="0"/>
-              <a:t>2. </a:t>
-            </a:r>
-            <a:r>
-              <a:rPr lang="ko-KR" altLang="ko-KR" dirty="0" err="1"/>
-              <a:t>인바운드</a:t>
-            </a:r>
-            <a:r>
-              <a:rPr lang="en-US" altLang="ko-KR" dirty="0"/>
-              <a:t> </a:t>
-            </a:r>
-            <a:r>
-              <a:rPr lang="ko-KR" altLang="ko-KR" dirty="0"/>
-              <a:t>규칙에 마우스 오른쪽 버튼을 누르고</a:t>
-            </a:r>
-            <a:r>
-              <a:rPr lang="en-US" altLang="ko-KR" dirty="0"/>
-              <a:t> '</a:t>
-            </a:r>
-            <a:r>
-              <a:rPr lang="ko-KR" altLang="ko-KR" dirty="0"/>
-              <a:t>새 규칙</a:t>
-            </a:r>
-            <a:r>
-              <a:rPr lang="en-US" altLang="ko-KR" dirty="0"/>
-              <a:t>' </a:t>
-            </a:r>
-            <a:r>
-              <a:rPr lang="ko-KR" altLang="ko-KR" dirty="0"/>
-              <a:t>클릭</a:t>
-            </a:r>
-            <a:r>
-              <a:rPr lang="en-US" altLang="ko-KR" dirty="0"/>
-              <a:t>(</a:t>
-            </a:r>
-            <a:r>
-              <a:rPr lang="ko-KR" altLang="ko-KR" dirty="0" err="1">
-                <a:solidFill>
-                  <a:srgbClr val="FF0000"/>
-                </a:solidFill>
-              </a:rPr>
-              <a:t>아웃바운드</a:t>
-            </a:r>
-            <a:r>
-              <a:rPr lang="en-US" altLang="ko-KR" dirty="0"/>
-              <a:t> </a:t>
-            </a:r>
-            <a:r>
-              <a:rPr lang="ko-KR" altLang="ko-KR" dirty="0"/>
-              <a:t>규칙도 동일하게 진행</a:t>
-            </a:r>
-            <a:r>
-              <a:rPr lang="en-US" altLang="ko-KR" dirty="0"/>
-              <a:t>)</a:t>
-            </a:r>
-            <a:endParaRPr lang="ko-KR" altLang="ko-KR" dirty="0"/>
+            <a:endParaRPr lang="ko-KR" altLang="en-US" sz="3200" strike="sngStrike" dirty="0"/>
           </a:p>
         </p:txBody>
       </p:sp>
       <p:pic>
         <p:nvPicPr>
-          <p:cNvPr id="7" name="그림 6" descr="C:\Users\KETI_UnstructedWork\AppData\Local\Microsoft\Windows\INetCache\Content.MSO\6A303971.tmp">
-            <a:extLst>
-              <a:ext uri="{FF2B5EF4-FFF2-40B4-BE49-F238E27FC236}">
-                <a16:creationId xmlns:a16="http://schemas.microsoft.com/office/drawing/2014/main" id="{BA0CD1A2-7BA9-47CB-A126-BAB8C3DFC9CD}"/>
+          <p:cNvPr id="19" name="그림 18" descr="C:\Users\KETI_UnstructedWork\AppData\Local\Microsoft\Windows\INetCache\Content.MSO\21287955.tmp">
+            <a:extLst>
+              <a:ext uri="{FF2B5EF4-FFF2-40B4-BE49-F238E27FC236}">
+                <a16:creationId xmlns:a16="http://schemas.microsoft.com/office/drawing/2014/main" id="{72C8A024-D4A3-46EC-9916-9E2B9C98CAA5}"/>
               </a:ext>
             </a:extLst>
           </p:cNvPr>
@@ -9981,8 +9973,8 @@
         </p:blipFill>
         <p:spPr bwMode="auto">
           <a:xfrm>
-            <a:off x="3473745" y="2728567"/>
-            <a:ext cx="4640210" cy="3453572"/>
+            <a:off x="838200" y="2342643"/>
+            <a:ext cx="4768910" cy="3936776"/>
           </a:xfrm>
           <a:prstGeom prst="rect">
             <a:avLst/>
@@ -9993,10 +9985,195 @@
           </a:ln>
         </p:spPr>
       </p:pic>
+      <p:sp>
+        <p:nvSpPr>
+          <p:cNvPr id="3" name="TextBox 2">
+            <a:extLst>
+              <a:ext uri="{FF2B5EF4-FFF2-40B4-BE49-F238E27FC236}">
+                <a16:creationId xmlns:a16="http://schemas.microsoft.com/office/drawing/2014/main" id="{FF53656A-FE07-42F5-B5F8-BDA79EA2D6A0}"/>
+              </a:ext>
+            </a:extLst>
+          </p:cNvPr>
+          <p:cNvSpPr txBox="1"/>
+          <p:nvPr/>
+        </p:nvSpPr>
+        <p:spPr>
+          <a:xfrm>
+            <a:off x="838200" y="1827954"/>
+            <a:ext cx="7800723" cy="369332"/>
+          </a:xfrm>
+          <a:prstGeom prst="rect">
+            <a:avLst/>
+          </a:prstGeom>
+          <a:noFill/>
+        </p:spPr>
+        <p:txBody>
+          <a:bodyPr wrap="square" rtlCol="0">
+            <a:spAutoFit/>
+          </a:bodyPr>
+          <a:lstStyle/>
+          <a:p>
+            <a:r>
+              <a:rPr lang="en-US" altLang="ko-KR" dirty="0"/>
+              <a:t>1. </a:t>
+            </a:r>
+            <a:r>
+              <a:rPr lang="ko-KR" altLang="ko-KR" dirty="0"/>
+              <a:t>방화벽 실행</a:t>
+            </a:r>
+            <a:r>
+              <a:rPr lang="en-US" altLang="ko-KR" dirty="0"/>
+              <a:t> -&gt; </a:t>
+            </a:r>
+            <a:r>
+              <a:rPr lang="ko-KR" altLang="ko-KR" dirty="0"/>
+              <a:t>고급 보안이 포함된</a:t>
+            </a:r>
+            <a:r>
+              <a:rPr lang="en-US" altLang="ko-KR" dirty="0"/>
+              <a:t> Windows Defender </a:t>
+            </a:r>
+            <a:r>
+              <a:rPr lang="ko-KR" altLang="ko-KR" dirty="0"/>
+              <a:t>방화벽</a:t>
+            </a:r>
+            <a:r>
+              <a:rPr lang="en-US" altLang="ko-KR" dirty="0"/>
+              <a:t>' </a:t>
+            </a:r>
+            <a:r>
+              <a:rPr lang="ko-KR" altLang="ko-KR" dirty="0"/>
+              <a:t>실행</a:t>
+            </a:r>
+            <a:r>
+              <a:rPr lang="en-US" altLang="ko-KR" dirty="0"/>
+              <a:t> </a:t>
+            </a:r>
+            <a:endParaRPr lang="ko-KR" altLang="ko-KR" dirty="0"/>
+          </a:p>
+        </p:txBody>
+      </p:sp>
+      <p:pic>
+        <p:nvPicPr>
+          <p:cNvPr id="25" name="그림 24" descr="C:\Users\KETI_UnstructedWork\AppData\Local\Microsoft\Windows\INetCache\Content.MSO\9D040B2B.tmp">
+            <a:extLst>
+              <a:ext uri="{FF2B5EF4-FFF2-40B4-BE49-F238E27FC236}">
+                <a16:creationId xmlns:a16="http://schemas.microsoft.com/office/drawing/2014/main" id="{D3B124BF-904F-463C-8D69-EC70AD26BCC2}"/>
+              </a:ext>
+            </a:extLst>
+          </p:cNvPr>
+          <p:cNvPicPr/>
+          <p:nvPr/>
+        </p:nvPicPr>
+        <p:blipFill>
+          <a:blip r:embed="rId3" cstate="print">
+            <a:extLst>
+              <a:ext uri="{28A0092B-C50C-407E-A947-70E740481C1C}">
+                <a14:useLocalDpi xmlns:a14="http://schemas.microsoft.com/office/drawing/2010/main" val="0"/>
+              </a:ext>
+            </a:extLst>
+          </a:blip>
+          <a:srcRect/>
+          <a:stretch>
+            <a:fillRect/>
+          </a:stretch>
+        </p:blipFill>
+        <p:spPr bwMode="auto">
+          <a:xfrm>
+            <a:off x="5903637" y="2853267"/>
+            <a:ext cx="4654576" cy="2463430"/>
+          </a:xfrm>
+          <a:prstGeom prst="rect">
+            <a:avLst/>
+          </a:prstGeom>
+          <a:noFill/>
+          <a:ln>
+            <a:noFill/>
+          </a:ln>
+        </p:spPr>
+      </p:pic>
+      <p:sp>
+        <p:nvSpPr>
+          <p:cNvPr id="6" name="TextBox 5">
+            <a:extLst>
+              <a:ext uri="{FF2B5EF4-FFF2-40B4-BE49-F238E27FC236}">
+                <a16:creationId xmlns:a16="http://schemas.microsoft.com/office/drawing/2014/main" id="{914DDE65-82E0-4E11-8175-0429F26C90A0}"/>
+              </a:ext>
+            </a:extLst>
+          </p:cNvPr>
+          <p:cNvSpPr txBox="1"/>
+          <p:nvPr/>
+        </p:nvSpPr>
+        <p:spPr>
+          <a:xfrm>
+            <a:off x="858918" y="1346216"/>
+            <a:ext cx="2003552" cy="215444"/>
+          </a:xfrm>
+          <a:prstGeom prst="rect">
+            <a:avLst/>
+          </a:prstGeom>
+          <a:noFill/>
+        </p:spPr>
+        <p:txBody>
+          <a:bodyPr wrap="square" rtlCol="0">
+            <a:spAutoFit/>
+          </a:bodyPr>
+          <a:lstStyle/>
+          <a:p>
+            <a:r>
+              <a:rPr lang="en-US" altLang="ko-KR" sz="800" dirty="0">
+                <a:solidFill>
+                  <a:srgbClr val="FF0000"/>
+                </a:solidFill>
+                <a:hlinkClick r:id="rId4" action="ppaction://hlinksldjump"/>
+              </a:rPr>
+              <a:t>5</a:t>
+            </a:r>
+            <a:r>
+              <a:rPr lang="ko-KR" altLang="en-US" sz="800" dirty="0">
+                <a:solidFill>
+                  <a:srgbClr val="FF0000"/>
+                </a:solidFill>
+                <a:hlinkClick r:id="rId4" action="ppaction://hlinksldjump"/>
+              </a:rPr>
+              <a:t>페이지 </a:t>
+            </a:r>
+            <a:r>
+              <a:rPr lang="ko-KR" altLang="en-US" sz="800" dirty="0">
+                <a:solidFill>
+                  <a:srgbClr val="FF0000"/>
+                </a:solidFill>
+              </a:rPr>
+              <a:t>설정을 진행한 경우</a:t>
+            </a:r>
+            <a:r>
+              <a:rPr lang="en-US" altLang="ko-KR" sz="800" dirty="0">
+                <a:solidFill>
+                  <a:srgbClr val="FF0000"/>
+                </a:solidFill>
+              </a:rPr>
+              <a:t>, </a:t>
+            </a:r>
+            <a:r>
+              <a:rPr lang="ko-KR" altLang="en-US" sz="800" dirty="0">
+                <a:solidFill>
+                  <a:srgbClr val="FF0000"/>
+                </a:solidFill>
+              </a:rPr>
+              <a:t>넘어가기</a:t>
+            </a:r>
+            <a:endParaRPr lang="ko-KR" altLang="ko-KR" sz="800" dirty="0">
+              <a:solidFill>
+                <a:srgbClr val="FF0000"/>
+              </a:solidFill>
+            </a:endParaRPr>
+          </a:p>
+        </p:txBody>
+      </p:sp>
     </p:spTree>
     <p:extLst>
       <p:ext uri="{BB962C8B-B14F-4D97-AF65-F5344CB8AC3E}">
-        <p14:creationId xmlns:p14="http://schemas.microsoft.com/office/powerpoint/2010/main" val="1587352459"/>
+        <p14:creationId xmlns:p14="http://schemas.microsoft.com/office/powerpoint/2010/main" val="2881201960"/>
       </p:ext>
     </p:extLst>
   </p:cSld>
@@ -10047,26 +10224,26 @@
           <a:lstStyle/>
           <a:p>
             <a:r>
-              <a:rPr lang="en-US" altLang="ko-KR" sz="3200" dirty="0"/>
+              <a:rPr lang="en-US" altLang="ko-KR" sz="3200" strike="sngStrike" dirty="0"/>
               <a:t>Windows</a:t>
             </a:r>
             <a:r>
-              <a:rPr lang="ko-KR" altLang="en-US" sz="3200" dirty="0"/>
+              <a:rPr lang="ko-KR" altLang="en-US" sz="3200" strike="sngStrike" dirty="0"/>
               <a:t> </a:t>
             </a:r>
             <a:r>
-              <a:rPr lang="en-US" altLang="ko-KR" sz="3200" dirty="0"/>
+              <a:rPr lang="en-US" altLang="ko-KR" sz="3200" strike="sngStrike" dirty="0"/>
               <a:t>NTP</a:t>
             </a:r>
             <a:r>
-              <a:rPr lang="ko-KR" altLang="en-US" sz="3200" dirty="0"/>
+              <a:rPr lang="ko-KR" altLang="en-US" sz="3200" strike="sngStrike" dirty="0"/>
               <a:t> </a:t>
             </a:r>
             <a:r>
-              <a:rPr lang="en-US" altLang="ko-KR" sz="3200" dirty="0"/>
+              <a:rPr lang="en-US" altLang="ko-KR" sz="3200" strike="sngStrike" dirty="0"/>
               <a:t>Server</a:t>
             </a:r>
-            <a:endParaRPr lang="ko-KR" altLang="en-US" sz="3200" dirty="0"/>
+            <a:endParaRPr lang="ko-KR" altLang="en-US" sz="3200" strike="sngStrike" dirty="0"/>
           </a:p>
         </p:txBody>
       </p:sp>
@@ -10098,45 +10275,47 @@
           </a:bodyPr>
           <a:lstStyle/>
           <a:p>
-            <a:pPr lvl="0" fontAlgn="base"/>
             <a:r>
               <a:rPr lang="en-US" altLang="ko-KR" dirty="0"/>
-              <a:t>3. </a:t>
-            </a:r>
-            <a:r>
-              <a:rPr lang="ko-KR" altLang="ko-KR" dirty="0"/>
-              <a:t>새</a:t>
+              <a:t>2. </a:t>
+            </a:r>
+            <a:r>
+              <a:rPr lang="ko-KR" altLang="ko-KR" dirty="0" err="1"/>
+              <a:t>인바운드</a:t>
             </a:r>
             <a:r>
               <a:rPr lang="en-US" altLang="ko-KR" dirty="0"/>
               <a:t> </a:t>
             </a:r>
             <a:r>
-              <a:rPr lang="ko-KR" altLang="ko-KR" dirty="0" err="1"/>
-              <a:t>인바운드</a:t>
+              <a:rPr lang="ko-KR" altLang="ko-KR" dirty="0"/>
+              <a:t>규칙에 마우스 오른쪽 버튼을 누르고</a:t>
             </a:r>
             <a:r>
               <a:rPr lang="en-US" altLang="ko-KR" dirty="0"/>
-              <a:t> </a:t>
+              <a:t> '</a:t>
             </a:r>
             <a:r>
               <a:rPr lang="ko-KR" altLang="ko-KR" dirty="0"/>
-              <a:t>규칙 생성</a:t>
+              <a:t>새 규칙</a:t>
             </a:r>
             <a:r>
               <a:rPr lang="en-US" altLang="ko-KR" dirty="0"/>
-              <a:t>  </a:t>
-            </a:r>
-            <a:endParaRPr lang="ko-KR" altLang="ko-KR" dirty="0"/>
+              <a:t>' </a:t>
+            </a:r>
+            <a:r>
+              <a:rPr lang="ko-KR" altLang="ko-KR" dirty="0"/>
+              <a:t>클릭</a:t>
+            </a:r>
           </a:p>
         </p:txBody>
       </p:sp>
       <p:pic>
         <p:nvPicPr>
-          <p:cNvPr id="11" name="그림 10" descr="C:\Users\KETI_UnstructedWork\AppData\Local\Microsoft\Windows\INetCache\Content.MSO\6C9D4BDF.tmp">
-            <a:extLst>
-              <a:ext uri="{FF2B5EF4-FFF2-40B4-BE49-F238E27FC236}">
-                <a16:creationId xmlns:a16="http://schemas.microsoft.com/office/drawing/2014/main" id="{012D80F8-A7E2-4A9A-94C0-CF1C0B8DD6DA}"/>
+          <p:cNvPr id="7" name="그림 6" descr="C:\Users\KETI_UnstructedWork\AppData\Local\Microsoft\Windows\INetCache\Content.MSO\6A303971.tmp">
+            <a:extLst>
+              <a:ext uri="{FF2B5EF4-FFF2-40B4-BE49-F238E27FC236}">
+                <a16:creationId xmlns:a16="http://schemas.microsoft.com/office/drawing/2014/main" id="{BA0CD1A2-7BA9-47CB-A126-BAB8C3DFC9CD}"/>
               </a:ext>
             </a:extLst>
           </p:cNvPr>
@@ -10158,8 +10337,8 @@
         </p:blipFill>
         <p:spPr bwMode="auto">
           <a:xfrm>
-            <a:off x="5600884" y="4633476"/>
-            <a:ext cx="3149398" cy="1745184"/>
+            <a:off x="3473745" y="2728567"/>
+            <a:ext cx="4640210" cy="3453572"/>
           </a:xfrm>
           <a:prstGeom prst="rect">
             <a:avLst/>
@@ -10170,166 +10349,88 @@
           </a:ln>
         </p:spPr>
       </p:pic>
-      <p:pic>
-        <p:nvPicPr>
-          <p:cNvPr id="12" name="그림 11" descr="C:\Users\KETI_UnstructedWork\AppData\Local\Microsoft\Windows\INetCache\Content.MSO\264BEDA7.tmp">
-            <a:extLst>
-              <a:ext uri="{FF2B5EF4-FFF2-40B4-BE49-F238E27FC236}">
-                <a16:creationId xmlns:a16="http://schemas.microsoft.com/office/drawing/2014/main" id="{04880B52-5FE6-4940-96B6-F7A3F0D2A671}"/>
-              </a:ext>
-            </a:extLst>
-          </p:cNvPr>
-          <p:cNvPicPr/>
+      <p:sp>
+        <p:nvSpPr>
+          <p:cNvPr id="5" name="TextBox 4">
+            <a:extLst>
+              <a:ext uri="{FF2B5EF4-FFF2-40B4-BE49-F238E27FC236}">
+                <a16:creationId xmlns:a16="http://schemas.microsoft.com/office/drawing/2014/main" id="{80C70B4F-5BE6-44E6-B84F-B5C9CB0226D1}"/>
+              </a:ext>
+            </a:extLst>
+          </p:cNvPr>
+          <p:cNvSpPr txBox="1"/>
           <p:nvPr/>
-        </p:nvPicPr>
-        <p:blipFill>
-          <a:blip r:embed="rId3" cstate="print">
-            <a:extLst>
-              <a:ext uri="{28A0092B-C50C-407E-A947-70E740481C1C}">
-                <a14:useLocalDpi xmlns:a14="http://schemas.microsoft.com/office/drawing/2010/main" val="0"/>
-              </a:ext>
-            </a:extLst>
-          </a:blip>
-          <a:srcRect/>
-          <a:stretch>
-            <a:fillRect/>
-          </a:stretch>
-        </p:blipFill>
-        <p:spPr bwMode="auto">
-          <a:xfrm>
-            <a:off x="1072473" y="2479557"/>
-            <a:ext cx="3144996" cy="1767180"/>
+        </p:nvSpPr>
+        <p:spPr>
+          <a:xfrm>
+            <a:off x="858918" y="1346216"/>
+            <a:ext cx="2003552" cy="215444"/>
           </a:xfrm>
           <a:prstGeom prst="rect">
             <a:avLst/>
           </a:prstGeom>
           <a:noFill/>
-          <a:ln>
-            <a:noFill/>
-          </a:ln>
         </p:spPr>
-      </p:pic>
-      <p:pic>
-        <p:nvPicPr>
-          <p:cNvPr id="13" name="그림 12" descr="C:\Users\KETI_UnstructedWork\AppData\Local\Microsoft\Windows\INetCache\Content.MSO\8F294D4D.tmp">
-            <a:extLst>
-              <a:ext uri="{FF2B5EF4-FFF2-40B4-BE49-F238E27FC236}">
-                <a16:creationId xmlns:a16="http://schemas.microsoft.com/office/drawing/2014/main" id="{5357FAC3-C3AB-4500-A031-2C604F3F584E}"/>
-              </a:ext>
-            </a:extLst>
-          </p:cNvPr>
-          <p:cNvPicPr/>
-          <p:nvPr/>
-        </p:nvPicPr>
-        <p:blipFill>
-          <a:blip r:embed="rId4" cstate="print">
-            <a:extLst>
-              <a:ext uri="{28A0092B-C50C-407E-A947-70E740481C1C}">
-                <a14:useLocalDpi xmlns:a14="http://schemas.microsoft.com/office/drawing/2010/main" val="0"/>
-              </a:ext>
-            </a:extLst>
-          </a:blip>
-          <a:srcRect/>
-          <a:stretch>
-            <a:fillRect/>
-          </a:stretch>
-        </p:blipFill>
-        <p:spPr bwMode="auto">
-          <a:xfrm>
-            <a:off x="4384910" y="2475890"/>
-            <a:ext cx="3169196" cy="1774514"/>
-          </a:xfrm>
-          <a:prstGeom prst="rect">
-            <a:avLst/>
-          </a:prstGeom>
-          <a:noFill/>
-          <a:ln>
-            <a:noFill/>
-          </a:ln>
-        </p:spPr>
-      </p:pic>
-      <p:pic>
-        <p:nvPicPr>
-          <p:cNvPr id="14" name="그림 13" descr="C:\Users\KETI_UnstructedWork\AppData\Local\Microsoft\Windows\INetCache\Content.MSO\2DFD19E3.tmp">
-            <a:extLst>
-              <a:ext uri="{FF2B5EF4-FFF2-40B4-BE49-F238E27FC236}">
-                <a16:creationId xmlns:a16="http://schemas.microsoft.com/office/drawing/2014/main" id="{C99A504B-19E9-45B1-BBF4-7D8B1AC4AAD4}"/>
-              </a:ext>
-            </a:extLst>
-          </p:cNvPr>
-          <p:cNvPicPr/>
-          <p:nvPr/>
-        </p:nvPicPr>
-        <p:blipFill>
-          <a:blip r:embed="rId5" cstate="print">
-            <a:extLst>
-              <a:ext uri="{28A0092B-C50C-407E-A947-70E740481C1C}">
-                <a14:useLocalDpi xmlns:a14="http://schemas.microsoft.com/office/drawing/2010/main" val="0"/>
-              </a:ext>
-            </a:extLst>
-          </a:blip>
-          <a:srcRect/>
-          <a:stretch>
-            <a:fillRect/>
-          </a:stretch>
-        </p:blipFill>
-        <p:spPr bwMode="auto">
-          <a:xfrm>
-            <a:off x="7721547" y="2483222"/>
-            <a:ext cx="3150130" cy="1759850"/>
-          </a:xfrm>
-          <a:prstGeom prst="rect">
-            <a:avLst/>
-          </a:prstGeom>
-          <a:noFill/>
-          <a:ln>
-            <a:noFill/>
-          </a:ln>
-        </p:spPr>
-      </p:pic>
-      <p:pic>
-        <p:nvPicPr>
-          <p:cNvPr id="15" name="그림 14" descr="C:\Users\KETI_UnstructedWork\AppData\Local\Microsoft\Windows\INetCache\Content.MSO\602510E9.tmp">
-            <a:extLst>
-              <a:ext uri="{FF2B5EF4-FFF2-40B4-BE49-F238E27FC236}">
-                <a16:creationId xmlns:a16="http://schemas.microsoft.com/office/drawing/2014/main" id="{5C77FB6C-9CD0-4762-8A69-FFF6F09B2DCB}"/>
-              </a:ext>
-            </a:extLst>
-          </p:cNvPr>
-          <p:cNvPicPr/>
-          <p:nvPr/>
-        </p:nvPicPr>
-        <p:blipFill>
-          <a:blip r:embed="rId6" cstate="print">
-            <a:extLst>
-              <a:ext uri="{28A0092B-C50C-407E-A947-70E740481C1C}">
-                <a14:useLocalDpi xmlns:a14="http://schemas.microsoft.com/office/drawing/2010/main" val="0"/>
-              </a:ext>
-            </a:extLst>
-          </a:blip>
-          <a:srcRect/>
-          <a:stretch>
-            <a:fillRect/>
-          </a:stretch>
-        </p:blipFill>
-        <p:spPr bwMode="auto">
-          <a:xfrm>
-            <a:off x="2284362" y="4622476"/>
-            <a:ext cx="3144998" cy="1756184"/>
-          </a:xfrm>
-          <a:prstGeom prst="rect">
-            <a:avLst/>
-          </a:prstGeom>
-          <a:noFill/>
-          <a:ln>
-            <a:noFill/>
-          </a:ln>
-        </p:spPr>
-      </p:pic>
+        <p:txBody>
+          <a:bodyPr wrap="square" rtlCol="0">
+            <a:spAutoFit/>
+          </a:bodyPr>
+          <a:lstStyle/>
+          <a:p>
+            <a:r>
+              <a:rPr lang="en-US" altLang="ko-KR" sz="800" dirty="0">
+                <a:solidFill>
+                  <a:srgbClr val="FF0000"/>
+                </a:solidFill>
+                <a:hlinkClick r:id="rId3" action="ppaction://hlinksldjump"/>
+              </a:rPr>
+              <a:t>5</a:t>
+            </a:r>
+            <a:r>
+              <a:rPr lang="ko-KR" altLang="en-US" sz="800" dirty="0">
+                <a:solidFill>
+                  <a:srgbClr val="FF0000"/>
+                </a:solidFill>
+                <a:hlinkClick r:id="rId3" action="ppaction://hlinksldjump"/>
+              </a:rPr>
+              <a:t>페이지 </a:t>
+            </a:r>
+            <a:r>
+              <a:rPr lang="ko-KR" altLang="en-US" sz="800" dirty="0">
+                <a:solidFill>
+                  <a:srgbClr val="FF0000"/>
+                </a:solidFill>
+              </a:rPr>
+              <a:t>설정을 진행한 경우</a:t>
+            </a:r>
+            <a:r>
+              <a:rPr lang="en-US" altLang="ko-KR" sz="800" dirty="0">
+                <a:solidFill>
+                  <a:srgbClr val="FF0000"/>
+                </a:solidFill>
+              </a:rPr>
+              <a:t>, </a:t>
+            </a:r>
+            <a:r>
+              <a:rPr lang="ko-KR" altLang="en-US" sz="800" dirty="0">
+                <a:solidFill>
+                  <a:srgbClr val="FF0000"/>
+                </a:solidFill>
+              </a:rPr>
+              <a:t>넘어가기</a:t>
+            </a:r>
+            <a:endParaRPr lang="ko-KR" altLang="ko-KR" sz="800" dirty="0">
+              <a:solidFill>
+                <a:srgbClr val="FF0000"/>
+              </a:solidFill>
+            </a:endParaRPr>
+          </a:p>
+        </p:txBody>
+      </p:sp>
     </p:spTree>
     <p:extLst>
       <p:ext uri="{BB962C8B-B14F-4D97-AF65-F5344CB8AC3E}">
-        <p14:creationId xmlns:p14="http://schemas.microsoft.com/office/powerpoint/2010/main" val="2985876166"/>
+        <p14:creationId xmlns:p14="http://schemas.microsoft.com/office/powerpoint/2010/main" val="1587352459"/>
       </p:ext>
     </p:extLst>
   </p:cSld>
@@ -10380,26 +10481,26 @@
           <a:lstStyle/>
           <a:p>
             <a:r>
-              <a:rPr lang="en-US" altLang="ko-KR" sz="3200" dirty="0"/>
+              <a:rPr lang="en-US" altLang="ko-KR" sz="3200" strike="sngStrike" dirty="0"/>
               <a:t>Windows</a:t>
             </a:r>
             <a:r>
-              <a:rPr lang="ko-KR" altLang="en-US" sz="3200" dirty="0"/>
+              <a:rPr lang="ko-KR" altLang="en-US" sz="3200" strike="sngStrike" dirty="0"/>
               <a:t> </a:t>
             </a:r>
             <a:r>
-              <a:rPr lang="en-US" altLang="ko-KR" sz="3200" dirty="0"/>
+              <a:rPr lang="en-US" altLang="ko-KR" sz="3200" strike="sngStrike" dirty="0"/>
               <a:t>NTP</a:t>
             </a:r>
             <a:r>
-              <a:rPr lang="ko-KR" altLang="en-US" sz="3200" dirty="0"/>
+              <a:rPr lang="ko-KR" altLang="en-US" sz="3200" strike="sngStrike" dirty="0"/>
               <a:t> </a:t>
             </a:r>
             <a:r>
-              <a:rPr lang="en-US" altLang="ko-KR" sz="3200" dirty="0"/>
+              <a:rPr lang="en-US" altLang="ko-KR" sz="3200" strike="sngStrike" dirty="0"/>
               <a:t>Server</a:t>
             </a:r>
-            <a:endParaRPr lang="ko-KR" altLang="en-US" sz="3200" dirty="0"/>
+            <a:endParaRPr lang="ko-KR" altLang="en-US" sz="3200" strike="sngStrike" dirty="0"/>
           </a:p>
         </p:txBody>
       </p:sp>
@@ -10417,7 +10518,7 @@
         </p:nvSpPr>
         <p:spPr>
           <a:xfrm>
-            <a:off x="838200" y="1658620"/>
+            <a:off x="838200" y="1827954"/>
             <a:ext cx="10320717" cy="369332"/>
           </a:xfrm>
           <a:prstGeom prst="rect">
@@ -10431,30 +10532,30 @@
           </a:bodyPr>
           <a:lstStyle/>
           <a:p>
-            <a:pPr fontAlgn="base"/>
+            <a:pPr lvl="0" fontAlgn="base"/>
             <a:r>
               <a:rPr lang="en-US" altLang="ko-KR" dirty="0"/>
-              <a:t>4. </a:t>
-            </a:r>
-            <a:r>
-              <a:rPr lang="ko-KR" altLang="en-US" dirty="0"/>
-              <a:t>관리자 권한으로 </a:t>
+              <a:t>3. </a:t>
+            </a:r>
+            <a:r>
+              <a:rPr lang="ko-KR" altLang="ko-KR" dirty="0"/>
+              <a:t>새</a:t>
             </a:r>
             <a:r>
               <a:rPr lang="en-US" altLang="ko-KR" dirty="0"/>
-              <a:t>Anaconda Prompt </a:t>
-            </a:r>
-            <a:r>
-              <a:rPr lang="ko-KR" altLang="en-US" dirty="0"/>
-              <a:t>실행 후</a:t>
+              <a:t> </a:t>
+            </a:r>
+            <a:r>
+              <a:rPr lang="ko-KR" altLang="ko-KR" dirty="0" err="1"/>
+              <a:t>인바운드</a:t>
             </a:r>
             <a:r>
               <a:rPr lang="en-US" altLang="ko-KR" dirty="0"/>
-              <a:t>, window_registry.py </a:t>
-            </a:r>
-            <a:r>
-              <a:rPr lang="ko-KR" altLang="en-US" dirty="0"/>
-              <a:t>실행</a:t>
+              <a:t> </a:t>
+            </a:r>
+            <a:r>
+              <a:rPr lang="ko-KR" altLang="ko-KR" dirty="0"/>
+              <a:t>규칙 생성</a:t>
             </a:r>
             <a:r>
               <a:rPr lang="en-US" altLang="ko-KR" dirty="0"/>
@@ -10466,37 +10567,281 @@
       </p:sp>
       <p:pic>
         <p:nvPicPr>
-          <p:cNvPr id="4" name="그림 3">
-            <a:extLst>
-              <a:ext uri="{FF2B5EF4-FFF2-40B4-BE49-F238E27FC236}">
-                <a16:creationId xmlns:a16="http://schemas.microsoft.com/office/drawing/2014/main" id="{89FF51CF-A9D5-494D-9EC5-49D6156DDAFC}"/>
-              </a:ext>
-            </a:extLst>
-          </p:cNvPr>
-          <p:cNvPicPr>
-            <a:picLocks noChangeAspect="1"/>
-          </p:cNvPicPr>
+          <p:cNvPr id="11" name="그림 10" descr="C:\Users\KETI_UnstructedWork\AppData\Local\Microsoft\Windows\INetCache\Content.MSO\6C9D4BDF.tmp">
+            <a:extLst>
+              <a:ext uri="{FF2B5EF4-FFF2-40B4-BE49-F238E27FC236}">
+                <a16:creationId xmlns:a16="http://schemas.microsoft.com/office/drawing/2014/main" id="{012D80F8-A7E2-4A9A-94C0-CF1C0B8DD6DA}"/>
+              </a:ext>
+            </a:extLst>
+          </p:cNvPr>
+          <p:cNvPicPr/>
           <p:nvPr/>
         </p:nvPicPr>
-        <p:blipFill rotWithShape="1">
-          <a:blip r:embed="rId2"/>
-          <a:srcRect t="494" b="9815"/>
-          <a:stretch/>
+        <p:blipFill>
+          <a:blip r:embed="rId2" cstate="print">
+            <a:extLst>
+              <a:ext uri="{28A0092B-C50C-407E-A947-70E740481C1C}">
+                <a14:useLocalDpi xmlns:a14="http://schemas.microsoft.com/office/drawing/2010/main" val="0"/>
+              </a:ext>
+            </a:extLst>
+          </a:blip>
+          <a:srcRect/>
+          <a:stretch>
+            <a:fillRect/>
+          </a:stretch>
         </p:blipFill>
-        <p:spPr>
-          <a:xfrm>
-            <a:off x="1530475" y="2180353"/>
-            <a:ext cx="4662884" cy="4398434"/>
+        <p:spPr bwMode="auto">
+          <a:xfrm>
+            <a:off x="5600884" y="4633476"/>
+            <a:ext cx="3149398" cy="1745184"/>
           </a:xfrm>
           <a:prstGeom prst="rect">
             <a:avLst/>
           </a:prstGeom>
+          <a:noFill/>
+          <a:ln>
+            <a:noFill/>
+          </a:ln>
         </p:spPr>
       </p:pic>
+      <p:pic>
+        <p:nvPicPr>
+          <p:cNvPr id="12" name="그림 11" descr="C:\Users\KETI_UnstructedWork\AppData\Local\Microsoft\Windows\INetCache\Content.MSO\264BEDA7.tmp">
+            <a:extLst>
+              <a:ext uri="{FF2B5EF4-FFF2-40B4-BE49-F238E27FC236}">
+                <a16:creationId xmlns:a16="http://schemas.microsoft.com/office/drawing/2014/main" id="{04880B52-5FE6-4940-96B6-F7A3F0D2A671}"/>
+              </a:ext>
+            </a:extLst>
+          </p:cNvPr>
+          <p:cNvPicPr/>
+          <p:nvPr/>
+        </p:nvPicPr>
+        <p:blipFill>
+          <a:blip r:embed="rId3" cstate="print">
+            <a:extLst>
+              <a:ext uri="{28A0092B-C50C-407E-A947-70E740481C1C}">
+                <a14:useLocalDpi xmlns:a14="http://schemas.microsoft.com/office/drawing/2010/main" val="0"/>
+              </a:ext>
+            </a:extLst>
+          </a:blip>
+          <a:srcRect/>
+          <a:stretch>
+            <a:fillRect/>
+          </a:stretch>
+        </p:blipFill>
+        <p:spPr bwMode="auto">
+          <a:xfrm>
+            <a:off x="1072473" y="2479557"/>
+            <a:ext cx="3144996" cy="1767180"/>
+          </a:xfrm>
+          <a:prstGeom prst="rect">
+            <a:avLst/>
+          </a:prstGeom>
+          <a:noFill/>
+          <a:ln>
+            <a:noFill/>
+          </a:ln>
+        </p:spPr>
+      </p:pic>
+      <p:pic>
+        <p:nvPicPr>
+          <p:cNvPr id="13" name="그림 12" descr="C:\Users\KETI_UnstructedWork\AppData\Local\Microsoft\Windows\INetCache\Content.MSO\8F294D4D.tmp">
+            <a:extLst>
+              <a:ext uri="{FF2B5EF4-FFF2-40B4-BE49-F238E27FC236}">
+                <a16:creationId xmlns:a16="http://schemas.microsoft.com/office/drawing/2014/main" id="{5357FAC3-C3AB-4500-A031-2C604F3F584E}"/>
+              </a:ext>
+            </a:extLst>
+          </p:cNvPr>
+          <p:cNvPicPr/>
+          <p:nvPr/>
+        </p:nvPicPr>
+        <p:blipFill>
+          <a:blip r:embed="rId4" cstate="print">
+            <a:extLst>
+              <a:ext uri="{28A0092B-C50C-407E-A947-70E740481C1C}">
+                <a14:useLocalDpi xmlns:a14="http://schemas.microsoft.com/office/drawing/2010/main" val="0"/>
+              </a:ext>
+            </a:extLst>
+          </a:blip>
+          <a:srcRect/>
+          <a:stretch>
+            <a:fillRect/>
+          </a:stretch>
+        </p:blipFill>
+        <p:spPr bwMode="auto">
+          <a:xfrm>
+            <a:off x="4384910" y="2475890"/>
+            <a:ext cx="3169196" cy="1774514"/>
+          </a:xfrm>
+          <a:prstGeom prst="rect">
+            <a:avLst/>
+          </a:prstGeom>
+          <a:noFill/>
+          <a:ln>
+            <a:noFill/>
+          </a:ln>
+        </p:spPr>
+      </p:pic>
+      <p:pic>
+        <p:nvPicPr>
+          <p:cNvPr id="14" name="그림 13" descr="C:\Users\KETI_UnstructedWork\AppData\Local\Microsoft\Windows\INetCache\Content.MSO\2DFD19E3.tmp">
+            <a:extLst>
+              <a:ext uri="{FF2B5EF4-FFF2-40B4-BE49-F238E27FC236}">
+                <a16:creationId xmlns:a16="http://schemas.microsoft.com/office/drawing/2014/main" id="{C99A504B-19E9-45B1-BBF4-7D8B1AC4AAD4}"/>
+              </a:ext>
+            </a:extLst>
+          </p:cNvPr>
+          <p:cNvPicPr/>
+          <p:nvPr/>
+        </p:nvPicPr>
+        <p:blipFill>
+          <a:blip r:embed="rId5" cstate="print">
+            <a:extLst>
+              <a:ext uri="{28A0092B-C50C-407E-A947-70E740481C1C}">
+                <a14:useLocalDpi xmlns:a14="http://schemas.microsoft.com/office/drawing/2010/main" val="0"/>
+              </a:ext>
+            </a:extLst>
+          </a:blip>
+          <a:srcRect/>
+          <a:stretch>
+            <a:fillRect/>
+          </a:stretch>
+        </p:blipFill>
+        <p:spPr bwMode="auto">
+          <a:xfrm>
+            <a:off x="7721547" y="2483222"/>
+            <a:ext cx="3150130" cy="1759850"/>
+          </a:xfrm>
+          <a:prstGeom prst="rect">
+            <a:avLst/>
+          </a:prstGeom>
+          <a:noFill/>
+          <a:ln>
+            <a:noFill/>
+          </a:ln>
+        </p:spPr>
+      </p:pic>
+      <p:pic>
+        <p:nvPicPr>
+          <p:cNvPr id="15" name="그림 14" descr="C:\Users\KETI_UnstructedWork\AppData\Local\Microsoft\Windows\INetCache\Content.MSO\602510E9.tmp">
+            <a:extLst>
+              <a:ext uri="{FF2B5EF4-FFF2-40B4-BE49-F238E27FC236}">
+                <a16:creationId xmlns:a16="http://schemas.microsoft.com/office/drawing/2014/main" id="{5C77FB6C-9CD0-4762-8A69-FFF6F09B2DCB}"/>
+              </a:ext>
+            </a:extLst>
+          </p:cNvPr>
+          <p:cNvPicPr/>
+          <p:nvPr/>
+        </p:nvPicPr>
+        <p:blipFill>
+          <a:blip r:embed="rId6" cstate="print">
+            <a:extLst>
+              <a:ext uri="{28A0092B-C50C-407E-A947-70E740481C1C}">
+                <a14:useLocalDpi xmlns:a14="http://schemas.microsoft.com/office/drawing/2010/main" val="0"/>
+              </a:ext>
+            </a:extLst>
+          </a:blip>
+          <a:srcRect/>
+          <a:stretch>
+            <a:fillRect/>
+          </a:stretch>
+        </p:blipFill>
+        <p:spPr bwMode="auto">
+          <a:xfrm>
+            <a:off x="2284362" y="4622476"/>
+            <a:ext cx="3144998" cy="1756184"/>
+          </a:xfrm>
+          <a:prstGeom prst="rect">
+            <a:avLst/>
+          </a:prstGeom>
+          <a:noFill/>
+          <a:ln>
+            <a:noFill/>
+          </a:ln>
+        </p:spPr>
+      </p:pic>
+      <p:sp>
+        <p:nvSpPr>
+          <p:cNvPr id="9" name="TextBox 8">
+            <a:extLst>
+              <a:ext uri="{FF2B5EF4-FFF2-40B4-BE49-F238E27FC236}">
+                <a16:creationId xmlns:a16="http://schemas.microsoft.com/office/drawing/2014/main" id="{2977D465-2E49-42CD-B33D-126142441245}"/>
+              </a:ext>
+            </a:extLst>
+          </p:cNvPr>
+          <p:cNvSpPr txBox="1"/>
+          <p:nvPr/>
+        </p:nvSpPr>
+        <p:spPr>
+          <a:xfrm>
+            <a:off x="858918" y="1346216"/>
+            <a:ext cx="2003552" cy="215444"/>
+          </a:xfrm>
+          <a:prstGeom prst="rect">
+            <a:avLst/>
+          </a:prstGeom>
+          <a:noFill/>
+        </p:spPr>
+        <p:txBody>
+          <a:bodyPr wrap="square" rtlCol="0">
+            <a:spAutoFit/>
+          </a:bodyPr>
+          <a:lstStyle/>
+          <a:p>
+            <a:r>
+              <a:rPr lang="en-US" altLang="ko-KR" sz="800" dirty="0">
+                <a:solidFill>
+                  <a:srgbClr val="FF0000"/>
+                </a:solidFill>
+                <a:hlinkClick r:id="rId7" action="ppaction://hlinksldjump"/>
+              </a:rPr>
+              <a:t>5</a:t>
+            </a:r>
+            <a:r>
+              <a:rPr lang="ko-KR" altLang="en-US" sz="800" dirty="0">
+                <a:solidFill>
+                  <a:srgbClr val="FF0000"/>
+                </a:solidFill>
+                <a:hlinkClick r:id="rId7" action="ppaction://hlinksldjump"/>
+              </a:rPr>
+              <a:t>페이지 </a:t>
+            </a:r>
+            <a:r>
+              <a:rPr lang="ko-KR" altLang="en-US" sz="800" dirty="0">
+                <a:solidFill>
+                  <a:srgbClr val="FF0000"/>
+                </a:solidFill>
+              </a:rPr>
+              <a:t>설정을 진행한 경우</a:t>
+            </a:r>
+            <a:r>
+              <a:rPr lang="en-US" altLang="ko-KR" sz="800" dirty="0">
+                <a:solidFill>
+                  <a:srgbClr val="FF0000"/>
+                </a:solidFill>
+              </a:rPr>
+              <a:t>, </a:t>
+            </a:r>
+            <a:r>
+              <a:rPr lang="ko-KR" altLang="en-US" sz="800" dirty="0">
+                <a:solidFill>
+                  <a:srgbClr val="FF0000"/>
+                </a:solidFill>
+              </a:rPr>
+              <a:t>넘어가기</a:t>
+            </a:r>
+            <a:endParaRPr lang="ko-KR" altLang="ko-KR" sz="800" dirty="0">
+              <a:solidFill>
+                <a:srgbClr val="FF0000"/>
+              </a:solidFill>
+            </a:endParaRPr>
+          </a:p>
+        </p:txBody>
+      </p:sp>
     </p:spTree>
     <p:extLst>
       <p:ext uri="{BB962C8B-B14F-4D97-AF65-F5344CB8AC3E}">
-        <p14:creationId xmlns:p14="http://schemas.microsoft.com/office/powerpoint/2010/main" val="187028842"/>
+        <p14:creationId xmlns:p14="http://schemas.microsoft.com/office/powerpoint/2010/main" val="2985876166"/>
       </p:ext>
     </p:extLst>
   </p:cSld>
@@ -10898,10 +11243,10 @@
       </p:pic>
       <p:sp>
         <p:nvSpPr>
-          <p:cNvPr id="8" name="TextBox 7">
-            <a:extLst>
-              <a:ext uri="{FF2B5EF4-FFF2-40B4-BE49-F238E27FC236}">
-                <a16:creationId xmlns:a16="http://schemas.microsoft.com/office/drawing/2014/main" id="{920F157E-9B79-4317-8740-3D2A3085D582}"/>
+          <p:cNvPr id="10" name="TextBox 9">
+            <a:extLst>
+              <a:ext uri="{FF2B5EF4-FFF2-40B4-BE49-F238E27FC236}">
+                <a16:creationId xmlns:a16="http://schemas.microsoft.com/office/drawing/2014/main" id="{82E6E457-8029-4487-8A14-111F45D5B80D}"/>
               </a:ext>
             </a:extLst>
           </p:cNvPr>
@@ -10931,7 +11276,7 @@
                 </a:solidFill>
                 <a:hlinkClick r:id="rId4" action="ppaction://hlinksldjump"/>
               </a:rPr>
-              <a:t>8</a:t>
+              <a:t>5</a:t>
             </a:r>
             <a:r>
               <a:rPr lang="ko-KR" altLang="en-US" sz="800" dirty="0">

</xml_diff>